<commit_message>
Adding new -hoping for last time- material
</commit_message>
<xml_diff>
--- a/00_Relazione/2-Modello e identificazione di un motore DC/Modello e identificazione di un motore DC.pptx
+++ b/00_Relazione/2-Modello e identificazione di un motore DC/Modello e identificazione di un motore DC.pptx
@@ -7790,8 +7790,8 @@
           </a:p>
         </p:txBody>
       </p:sp>
-      <mc:AlternateContent xmlns:mc="http://schemas.openxmlformats.org/markup-compatibility/2006">
-        <mc:Choice xmlns:a14="http://schemas.microsoft.com/office/drawing/2010/main" Requires="a14">
+      <mc:AlternateContent xmlns:mc="http://schemas.openxmlformats.org/markup-compatibility/2006" xmlns:a14="http://schemas.microsoft.com/office/drawing/2010/main">
+        <mc:Choice Requires="a14">
           <p:sp>
             <p:nvSpPr>
               <p:cNvPr id="16" name="CasellaDiTesto 15">
@@ -7884,7 +7884,7 @@
             </p:txBody>
           </p:sp>
         </mc:Choice>
-        <mc:Fallback>
+        <mc:Fallback xmlns="">
           <p:sp>
             <p:nvSpPr>
               <p:cNvPr id="16" name="CasellaDiTesto 15">
@@ -7929,8 +7929,8 @@
           </p:sp>
         </mc:Fallback>
       </mc:AlternateContent>
-      <mc:AlternateContent xmlns:mc="http://schemas.openxmlformats.org/markup-compatibility/2006">
-        <mc:Choice xmlns:a14="http://schemas.microsoft.com/office/drawing/2010/main" Requires="a14">
+      <mc:AlternateContent xmlns:mc="http://schemas.openxmlformats.org/markup-compatibility/2006" xmlns:a14="http://schemas.microsoft.com/office/drawing/2010/main">
+        <mc:Choice Requires="a14">
           <p:sp>
             <p:nvSpPr>
               <p:cNvPr id="17" name="CasellaDiTesto 16">
@@ -8024,7 +8024,7 @@
             </p:txBody>
           </p:sp>
         </mc:Choice>
-        <mc:Fallback>
+        <mc:Fallback xmlns="">
           <p:sp>
             <p:nvSpPr>
               <p:cNvPr id="17" name="CasellaDiTesto 16">
@@ -8069,8 +8069,8 @@
           </p:sp>
         </mc:Fallback>
       </mc:AlternateContent>
-      <mc:AlternateContent xmlns:mc="http://schemas.openxmlformats.org/markup-compatibility/2006">
-        <mc:Choice xmlns:a14="http://schemas.microsoft.com/office/drawing/2010/main" Requires="a14">
+      <mc:AlternateContent xmlns:mc="http://schemas.openxmlformats.org/markup-compatibility/2006" xmlns:a14="http://schemas.microsoft.com/office/drawing/2010/main">
+        <mc:Choice Requires="a14">
           <p:sp>
             <p:nvSpPr>
               <p:cNvPr id="18" name="CasellaDiTesto 17">
@@ -8220,7 +8220,7 @@
             </p:txBody>
           </p:sp>
         </mc:Choice>
-        <mc:Fallback>
+        <mc:Fallback xmlns="">
           <p:sp>
             <p:nvSpPr>
               <p:cNvPr id="18" name="CasellaDiTesto 17">
@@ -8265,8 +8265,8 @@
           </p:sp>
         </mc:Fallback>
       </mc:AlternateContent>
-      <mc:AlternateContent xmlns:mc="http://schemas.openxmlformats.org/markup-compatibility/2006">
-        <mc:Choice xmlns:a14="http://schemas.microsoft.com/office/drawing/2010/main" Requires="a14">
+      <mc:AlternateContent xmlns:mc="http://schemas.openxmlformats.org/markup-compatibility/2006" xmlns:a14="http://schemas.microsoft.com/office/drawing/2010/main">
+        <mc:Choice Requires="a14">
           <p:sp>
             <p:nvSpPr>
               <p:cNvPr id="19" name="CasellaDiTesto 18">
@@ -8392,7 +8392,7 @@
             </p:txBody>
           </p:sp>
         </mc:Choice>
-        <mc:Fallback>
+        <mc:Fallback xmlns="">
           <p:sp>
             <p:nvSpPr>
               <p:cNvPr id="19" name="CasellaDiTesto 18">
@@ -8437,8 +8437,8 @@
           </p:sp>
         </mc:Fallback>
       </mc:AlternateContent>
-      <mc:AlternateContent xmlns:mc="http://schemas.openxmlformats.org/markup-compatibility/2006">
-        <mc:Choice xmlns:a14="http://schemas.microsoft.com/office/drawing/2010/main" Requires="a14">
+      <mc:AlternateContent xmlns:mc="http://schemas.openxmlformats.org/markup-compatibility/2006" xmlns:a14="http://schemas.microsoft.com/office/drawing/2010/main">
+        <mc:Choice Requires="a14">
           <p:sp>
             <p:nvSpPr>
               <p:cNvPr id="20" name="CasellaDiTesto 19">
@@ -8546,7 +8546,7 @@
             </p:txBody>
           </p:sp>
         </mc:Choice>
-        <mc:Fallback>
+        <mc:Fallback xmlns="">
           <p:sp>
             <p:nvSpPr>
               <p:cNvPr id="20" name="CasellaDiTesto 19">
@@ -8970,8 +8970,8 @@
           </a:p>
         </p:txBody>
       </p:sp>
-      <mc:AlternateContent xmlns:mc="http://schemas.openxmlformats.org/markup-compatibility/2006">
-        <mc:Choice xmlns:a14="http://schemas.microsoft.com/office/drawing/2010/main" Requires="a14">
+      <mc:AlternateContent xmlns:mc="http://schemas.openxmlformats.org/markup-compatibility/2006" xmlns:a14="http://schemas.microsoft.com/office/drawing/2010/main">
+        <mc:Choice Requires="a14">
           <p:sp>
             <p:nvSpPr>
               <p:cNvPr id="14" name="Segnaposto contenuto 13"/>
@@ -9074,7 +9074,7 @@
             </p:txBody>
           </p:sp>
         </mc:Choice>
-        <mc:Fallback>
+        <mc:Fallback xmlns="">
           <p:sp>
             <p:nvSpPr>
               <p:cNvPr id="14" name="Segnaposto contenuto 13"/>
@@ -9184,8 +9184,8 @@
           </a:prstGeom>
         </p:spPr>
       </p:pic>
-      <mc:AlternateContent xmlns:mc="http://schemas.openxmlformats.org/markup-compatibility/2006">
-        <mc:Choice xmlns:a14="http://schemas.microsoft.com/office/drawing/2010/main" Requires="a14">
+      <mc:AlternateContent xmlns:mc="http://schemas.openxmlformats.org/markup-compatibility/2006" xmlns:a14="http://schemas.microsoft.com/office/drawing/2010/main">
+        <mc:Choice Requires="a14">
           <p:sp>
             <p:nvSpPr>
               <p:cNvPr id="8" name="CasellaDiTesto 7">
@@ -9249,7 +9249,7 @@
             </p:txBody>
           </p:sp>
         </mc:Choice>
-        <mc:Fallback>
+        <mc:Fallback xmlns="">
           <p:sp>
             <p:nvSpPr>
               <p:cNvPr id="8" name="CasellaDiTesto 7">
@@ -9928,8 +9928,8 @@
           </a:prstGeom>
         </p:spPr>
       </p:pic>
-      <mc:AlternateContent xmlns:mc="http://schemas.openxmlformats.org/markup-compatibility/2006">
-        <mc:Choice xmlns:a14="http://schemas.microsoft.com/office/drawing/2010/main" Requires="a14">
+      <mc:AlternateContent xmlns:mc="http://schemas.openxmlformats.org/markup-compatibility/2006" xmlns:a14="http://schemas.microsoft.com/office/drawing/2010/main">
+        <mc:Choice Requires="a14">
           <p:sp>
             <p:nvSpPr>
               <p:cNvPr id="9" name="CasellaDiTesto 8">
@@ -10236,7 +10236,7 @@
             </p:txBody>
           </p:sp>
         </mc:Choice>
-        <mc:Fallback>
+        <mc:Fallback xmlns="">
           <p:sp>
             <p:nvSpPr>
               <p:cNvPr id="9" name="CasellaDiTesto 8">
@@ -10317,8 +10317,8 @@
           </a:prstGeom>
         </p:spPr>
       </p:pic>
-      <mc:AlternateContent xmlns:mc="http://schemas.openxmlformats.org/markup-compatibility/2006">
-        <mc:Choice xmlns:a14="http://schemas.microsoft.com/office/drawing/2010/main" Requires="a14">
+      <mc:AlternateContent xmlns:mc="http://schemas.openxmlformats.org/markup-compatibility/2006" xmlns:a14="http://schemas.microsoft.com/office/drawing/2010/main">
+        <mc:Choice Requires="a14">
           <p:sp>
             <p:nvSpPr>
               <p:cNvPr id="14" name="CasellaDiTesto 13">
@@ -10371,7 +10371,7 @@
             </p:txBody>
           </p:sp>
         </mc:Choice>
-        <mc:Fallback>
+        <mc:Fallback xmlns="">
           <p:sp>
             <p:nvSpPr>
               <p:cNvPr id="14" name="CasellaDiTesto 13">
@@ -10762,8 +10762,8 @@
           </a:prstGeom>
         </p:spPr>
       </p:pic>
-      <mc:AlternateContent xmlns:mc="http://schemas.openxmlformats.org/markup-compatibility/2006">
-        <mc:Choice xmlns:a14="http://schemas.microsoft.com/office/drawing/2010/main" Requires="a14">
+      <mc:AlternateContent xmlns:mc="http://schemas.openxmlformats.org/markup-compatibility/2006" xmlns:a14="http://schemas.microsoft.com/office/drawing/2010/main">
+        <mc:Choice Requires="a14">
           <p:sp>
             <p:nvSpPr>
               <p:cNvPr id="15" name="CasellaDiTesto 14">
@@ -10829,7 +10829,7 @@
             </p:txBody>
           </p:sp>
         </mc:Choice>
-        <mc:Fallback>
+        <mc:Fallback xmlns="">
           <p:sp>
             <p:nvSpPr>
               <p:cNvPr id="15" name="CasellaDiTesto 14">
@@ -11292,8 +11292,8 @@
           </a:p>
         </p:txBody>
       </p:sp>
-      <mc:AlternateContent xmlns:mc="http://schemas.openxmlformats.org/markup-compatibility/2006">
-        <mc:Choice xmlns:a14="http://schemas.microsoft.com/office/drawing/2010/main" Requires="a14">
+      <mc:AlternateContent xmlns:mc="http://schemas.openxmlformats.org/markup-compatibility/2006" xmlns:a14="http://schemas.microsoft.com/office/drawing/2010/main">
+        <mc:Choice Requires="a14">
           <p:sp>
             <p:nvSpPr>
               <p:cNvPr id="10" name="Rettangolo 9">
@@ -11381,7 +11381,7 @@
             </p:txBody>
           </p:sp>
         </mc:Choice>
-        <mc:Fallback>
+        <mc:Fallback xmlns="">
           <p:sp>
             <p:nvSpPr>
               <p:cNvPr id="10" name="Rettangolo 9">
@@ -11426,8 +11426,8 @@
           </p:sp>
         </mc:Fallback>
       </mc:AlternateContent>
-      <mc:AlternateContent xmlns:mc="http://schemas.openxmlformats.org/markup-compatibility/2006">
-        <mc:Choice xmlns:a14="http://schemas.microsoft.com/office/drawing/2010/main" Requires="a14">
+      <mc:AlternateContent xmlns:mc="http://schemas.openxmlformats.org/markup-compatibility/2006" xmlns:a14="http://schemas.microsoft.com/office/drawing/2010/main">
+        <mc:Choice Requires="a14">
           <p:sp>
             <p:nvSpPr>
               <p:cNvPr id="11" name="CasellaDiTesto 10">
@@ -11874,7 +11874,7 @@
             </p:txBody>
           </p:sp>
         </mc:Choice>
-        <mc:Fallback>
+        <mc:Fallback xmlns="">
           <p:sp>
             <p:nvSpPr>
               <p:cNvPr id="11" name="CasellaDiTesto 10">
@@ -11919,8 +11919,8 @@
           </p:sp>
         </mc:Fallback>
       </mc:AlternateContent>
-      <mc:AlternateContent xmlns:mc="http://schemas.openxmlformats.org/markup-compatibility/2006">
-        <mc:Choice xmlns:a14="http://schemas.microsoft.com/office/drawing/2010/main" Requires="a14">
+      <mc:AlternateContent xmlns:mc="http://schemas.openxmlformats.org/markup-compatibility/2006" xmlns:a14="http://schemas.microsoft.com/office/drawing/2010/main">
+        <mc:Choice Requires="a14">
           <p:sp>
             <p:nvSpPr>
               <p:cNvPr id="12" name="CasellaDiTesto 11">
@@ -12062,7 +12062,7 @@
             </p:txBody>
           </p:sp>
         </mc:Choice>
-        <mc:Fallback>
+        <mc:Fallback xmlns="">
           <p:sp>
             <p:nvSpPr>
               <p:cNvPr id="12" name="CasellaDiTesto 11">
@@ -12224,8 +12224,8 @@
           </a:p>
         </p:txBody>
       </p:sp>
-      <mc:AlternateContent xmlns:mc="http://schemas.openxmlformats.org/markup-compatibility/2006">
-        <mc:Choice xmlns:a14="http://schemas.microsoft.com/office/drawing/2010/main" Requires="a14">
+      <mc:AlternateContent xmlns:mc="http://schemas.openxmlformats.org/markup-compatibility/2006" xmlns:a14="http://schemas.microsoft.com/office/drawing/2010/main">
+        <mc:Choice Requires="a14">
           <p:sp>
             <p:nvSpPr>
               <p:cNvPr id="4" name="CasellaDiTesto 3">
@@ -12349,7 +12349,7 @@
             </p:txBody>
           </p:sp>
         </mc:Choice>
-        <mc:Fallback>
+        <mc:Fallback xmlns="">
           <p:sp>
             <p:nvSpPr>
               <p:cNvPr id="4" name="CasellaDiTesto 3">
@@ -12466,8 +12466,8 @@
           </a:prstGeom>
         </p:spPr>
       </p:pic>
-      <mc:AlternateContent xmlns:mc="http://schemas.openxmlformats.org/markup-compatibility/2006">
-        <mc:Choice xmlns:a14="http://schemas.microsoft.com/office/drawing/2010/main" Requires="a14">
+      <mc:AlternateContent xmlns:mc="http://schemas.openxmlformats.org/markup-compatibility/2006" xmlns:a14="http://schemas.microsoft.com/office/drawing/2010/main">
+        <mc:Choice Requires="a14">
           <p:sp>
             <p:nvSpPr>
               <p:cNvPr id="3" name="CasellaDiTesto 2">
@@ -12629,7 +12629,7 @@
             </p:txBody>
           </p:sp>
         </mc:Choice>
-        <mc:Fallback>
+        <mc:Fallback xmlns="">
           <p:sp>
             <p:nvSpPr>
               <p:cNvPr id="3" name="CasellaDiTesto 2">

</xml_diff>